<commit_message>
navbar  - returned container  - menu items given more padding
added main content to index.html
 - added "who we are" section
 - added "sermons" section
 - added "events" section
 - added "prayer" section
</commit_message>
<xml_diff>
--- a/img/carousel-images.pptx
+++ b/img/carousel-images.pptx
@@ -14,6 +14,7 @@
     <p:sldId id="259" r:id="rId8"/>
     <p:sldId id="260" r:id="rId9"/>
     <p:sldId id="261" r:id="rId10"/>
+    <p:sldId id="265" r:id="rId11"/>
   </p:sldIdLst>
   <p:sldSz cx="19202400" cy="8229600"/>
   <p:notesSz cx="6858000" cy="9144000"/>
@@ -251,7 +252,7 @@
           <a:p>
             <a:fld id="{7B30DEEB-4051-4B0C-A7AF-4DAE803EFFB5}" type="datetimeFigureOut">
               <a:rPr lang="en-US" smtClean="0"/>
-              <a:t>10/3/2017</a:t>
+              <a:t>10/5/2017</a:t>
             </a:fld>
             <a:endParaRPr lang="en-US"/>
           </a:p>
@@ -421,7 +422,7 @@
           <a:p>
             <a:fld id="{7B30DEEB-4051-4B0C-A7AF-4DAE803EFFB5}" type="datetimeFigureOut">
               <a:rPr lang="en-US" smtClean="0"/>
-              <a:t>10/3/2017</a:t>
+              <a:t>10/5/2017</a:t>
             </a:fld>
             <a:endParaRPr lang="en-US"/>
           </a:p>
@@ -601,7 +602,7 @@
           <a:p>
             <a:fld id="{7B30DEEB-4051-4B0C-A7AF-4DAE803EFFB5}" type="datetimeFigureOut">
               <a:rPr lang="en-US" smtClean="0"/>
-              <a:t>10/3/2017</a:t>
+              <a:t>10/5/2017</a:t>
             </a:fld>
             <a:endParaRPr lang="en-US"/>
           </a:p>
@@ -771,7 +772,7 @@
           <a:p>
             <a:fld id="{7B30DEEB-4051-4B0C-A7AF-4DAE803EFFB5}" type="datetimeFigureOut">
               <a:rPr lang="en-US" smtClean="0"/>
-              <a:t>10/3/2017</a:t>
+              <a:t>10/5/2017</a:t>
             </a:fld>
             <a:endParaRPr lang="en-US"/>
           </a:p>
@@ -1017,7 +1018,7 @@
           <a:p>
             <a:fld id="{7B30DEEB-4051-4B0C-A7AF-4DAE803EFFB5}" type="datetimeFigureOut">
               <a:rPr lang="en-US" smtClean="0"/>
-              <a:t>10/3/2017</a:t>
+              <a:t>10/5/2017</a:t>
             </a:fld>
             <a:endParaRPr lang="en-US"/>
           </a:p>
@@ -1249,7 +1250,7 @@
           <a:p>
             <a:fld id="{7B30DEEB-4051-4B0C-A7AF-4DAE803EFFB5}" type="datetimeFigureOut">
               <a:rPr lang="en-US" smtClean="0"/>
-              <a:t>10/3/2017</a:t>
+              <a:t>10/5/2017</a:t>
             </a:fld>
             <a:endParaRPr lang="en-US"/>
           </a:p>
@@ -1616,7 +1617,7 @@
           <a:p>
             <a:fld id="{7B30DEEB-4051-4B0C-A7AF-4DAE803EFFB5}" type="datetimeFigureOut">
               <a:rPr lang="en-US" smtClean="0"/>
-              <a:t>10/3/2017</a:t>
+              <a:t>10/5/2017</a:t>
             </a:fld>
             <a:endParaRPr lang="en-US"/>
           </a:p>
@@ -1734,7 +1735,7 @@
           <a:p>
             <a:fld id="{7B30DEEB-4051-4B0C-A7AF-4DAE803EFFB5}" type="datetimeFigureOut">
               <a:rPr lang="en-US" smtClean="0"/>
-              <a:t>10/3/2017</a:t>
+              <a:t>10/5/2017</a:t>
             </a:fld>
             <a:endParaRPr lang="en-US"/>
           </a:p>
@@ -1829,7 +1830,7 @@
           <a:p>
             <a:fld id="{7B30DEEB-4051-4B0C-A7AF-4DAE803EFFB5}" type="datetimeFigureOut">
               <a:rPr lang="en-US" smtClean="0"/>
-              <a:t>10/3/2017</a:t>
+              <a:t>10/5/2017</a:t>
             </a:fld>
             <a:endParaRPr lang="en-US"/>
           </a:p>
@@ -2106,7 +2107,7 @@
           <a:p>
             <a:fld id="{7B30DEEB-4051-4B0C-A7AF-4DAE803EFFB5}" type="datetimeFigureOut">
               <a:rPr lang="en-US" smtClean="0"/>
-              <a:t>10/3/2017</a:t>
+              <a:t>10/5/2017</a:t>
             </a:fld>
             <a:endParaRPr lang="en-US"/>
           </a:p>
@@ -2363,7 +2364,7 @@
           <a:p>
             <a:fld id="{7B30DEEB-4051-4B0C-A7AF-4DAE803EFFB5}" type="datetimeFigureOut">
               <a:rPr lang="en-US" smtClean="0"/>
-              <a:t>10/3/2017</a:t>
+              <a:t>10/5/2017</a:t>
             </a:fld>
             <a:endParaRPr lang="en-US"/>
           </a:p>
@@ -2576,7 +2577,7 @@
           <a:p>
             <a:fld id="{7B30DEEB-4051-4B0C-A7AF-4DAE803EFFB5}" type="datetimeFigureOut">
               <a:rPr lang="en-US" smtClean="0"/>
-              <a:t>10/3/2017</a:t>
+              <a:t>10/5/2017</a:t>
             </a:fld>
             <a:endParaRPr lang="en-US"/>
           </a:p>
@@ -2999,6 +3000,80 @@
     <p:extLst>
       <p:ext uri="{BB962C8B-B14F-4D97-AF65-F5344CB8AC3E}">
         <p14:creationId xmlns:p14="http://schemas.microsoft.com/office/powerpoint/2010/main" val="3291192868"/>
+      </p:ext>
+    </p:extLst>
+  </p:cSld>
+  <p:clrMapOvr>
+    <a:masterClrMapping/>
+  </p:clrMapOvr>
+</p:sld>
+</file>
+
+<file path=ppt/slides/slide10.xml><?xml version="1.0" encoding="utf-8"?>
+<p:sld xmlns:a="http://schemas.openxmlformats.org/drawingml/2006/main" xmlns:r="http://schemas.openxmlformats.org/officeDocument/2006/relationships" xmlns:p="http://schemas.openxmlformats.org/presentationml/2006/main">
+  <p:cSld>
+    <p:bg>
+      <p:bgPr>
+        <a:blipFill dpi="0" rotWithShape="1">
+          <a:blip r:embed="rId2">
+            <a:lum/>
+          </a:blip>
+          <a:srcRect/>
+          <a:stretch>
+            <a:fillRect t="-38000" b="-38000"/>
+          </a:stretch>
+        </a:blipFill>
+        <a:effectLst/>
+      </p:bgPr>
+    </p:bg>
+    <p:spTree>
+      <p:nvGrpSpPr>
+        <p:cNvPr id="1" name=""/>
+        <p:cNvGrpSpPr/>
+        <p:nvPr/>
+      </p:nvGrpSpPr>
+      <p:grpSpPr>
+        <a:xfrm>
+          <a:off x="0" y="0"/>
+          <a:ext cx="0" cy="0"/>
+          <a:chOff x="0" y="0"/>
+          <a:chExt cx="0" cy="0"/>
+        </a:xfrm>
+      </p:grpSpPr>
+      <p:pic>
+        <p:nvPicPr>
+          <p:cNvPr id="2" name="Picture 1"/>
+          <p:cNvPicPr>
+            <a:picLocks noChangeAspect="1"/>
+          </p:cNvPicPr>
+          <p:nvPr/>
+        </p:nvPicPr>
+        <p:blipFill>
+          <a:blip r:embed="rId3" cstate="print">
+            <a:extLst>
+              <a:ext uri="{28A0092B-C50C-407E-A947-70E740481C1C}">
+                <a14:useLocalDpi xmlns:a14="http://schemas.microsoft.com/office/drawing/2010/main" val="0"/>
+              </a:ext>
+            </a:extLst>
+          </a:blip>
+          <a:stretch>
+            <a:fillRect/>
+          </a:stretch>
+        </p:blipFill>
+        <p:spPr>
+          <a:xfrm>
+            <a:off x="5349239" y="902208"/>
+            <a:ext cx="8503922" cy="6425184"/>
+          </a:xfrm>
+          <a:prstGeom prst="rect">
+            <a:avLst/>
+          </a:prstGeom>
+        </p:spPr>
+      </p:pic>
+    </p:spTree>
+    <p:extLst>
+      <p:ext uri="{BB962C8B-B14F-4D97-AF65-F5344CB8AC3E}">
+        <p14:creationId xmlns:p14="http://schemas.microsoft.com/office/powerpoint/2010/main" val="2628737580"/>
       </p:ext>
     </p:extLst>
   </p:cSld>

</xml_diff>